<commit_message>
final updates for Spring 2023
</commit_message>
<xml_diff>
--- a/_lectures/week14/course_evaluations.pptx
+++ b/_lectures/week14/course_evaluations.pptx
@@ -216,7 +216,7 @@
           <a:p>
             <a:fld id="{CC53F594-6A45-4DCD-BAEF-02CFE42C0168}" type="datetimeFigureOut">
               <a:rPr lang="en-US" smtClean="0"/>
-              <a:t>1/2/2023</a:t>
+              <a:t>4/25/2023</a:t>
             </a:fld>
             <a:endParaRPr lang="en-US"/>
           </a:p>
@@ -381,7 +381,7 @@
           <a:p>
             <a:fld id="{4B81CF63-6211-47B7-BD1D-FD86C8A427C8}" type="datetimeFigureOut">
               <a:rPr lang="en-US" smtClean="0"/>
-              <a:t>1/2/2023</a:t>
+              <a:t>4/25/2023</a:t>
             </a:fld>
             <a:endParaRPr lang="en-US"/>
           </a:p>
@@ -1318,67 +1318,92 @@
         </p:spPr>
         <p:txBody>
           <a:bodyPr>
-            <a:normAutofit fontScale="85000" lnSpcReduction="20000"/>
+            <a:normAutofit/>
           </a:bodyPr>
           <a:lstStyle/>
           <a:p>
             <a:r>
-              <a:rPr lang="en-US" sz="4000" dirty="0"/>
-              <a:t>Two ways to access:</a:t>
+              <a:rPr lang="en-US" sz="3200" b="1" dirty="0">
+                <a:solidFill>
+                  <a:srgbClr val="0070C0"/>
+                </a:solidFill>
+              </a:rPr>
+              <a:t>These are important and I really value your feedback</a:t>
+            </a:r>
+          </a:p>
+          <a:p>
+            <a:r>
+              <a:rPr lang="en-US" sz="3200" dirty="0"/>
+              <a:t>Responses are </a:t>
+            </a:r>
+            <a:r>
+              <a:rPr lang="en-US" sz="3200" b="1" dirty="0"/>
+              <a:t>anonymous</a:t>
+            </a:r>
+            <a:r>
+              <a:rPr lang="en-US" sz="3200" dirty="0"/>
+              <a:t> and I won't see until after grades are submitted</a:t>
+            </a:r>
+          </a:p>
+          <a:p>
+            <a:r>
+              <a:rPr lang="en-US" sz="3200" dirty="0"/>
+              <a:t>If </a:t>
+            </a:r>
+            <a:r>
+              <a:rPr lang="en-US" sz="3200" b="1" dirty="0"/>
+              <a:t>33% </a:t>
+            </a:r>
+            <a:r>
+              <a:rPr lang="en-US" sz="3200" dirty="0"/>
+              <a:t>of the class fills it, everyone gets </a:t>
+            </a:r>
+            <a:r>
+              <a:rPr lang="en-US" sz="3200" b="1" dirty="0"/>
+              <a:t>+1 </a:t>
+            </a:r>
+            <a:r>
+              <a:rPr lang="en-US" sz="3200" dirty="0"/>
+              <a:t>on final</a:t>
+            </a:r>
+          </a:p>
+          <a:p>
+            <a:r>
+              <a:rPr lang="en-US" sz="3200" dirty="0"/>
+              <a:t>If </a:t>
+            </a:r>
+            <a:r>
+              <a:rPr lang="en-US" sz="3200" b="1" dirty="0"/>
+              <a:t>67% </a:t>
+            </a:r>
+            <a:r>
+              <a:rPr lang="en-US" sz="3200" dirty="0"/>
+              <a:t>of the class fills it, everyone gets</a:t>
+            </a:r>
+            <a:r>
+              <a:rPr lang="en-US" sz="3200" b="1" dirty="0"/>
+              <a:t> +3 </a:t>
+            </a:r>
+            <a:r>
+              <a:rPr lang="en-US" sz="3200" dirty="0"/>
+              <a:t>on final</a:t>
+            </a:r>
+          </a:p>
+          <a:p>
+            <a:r>
+              <a:rPr lang="en-US" sz="3200" dirty="0"/>
+              <a:t>To access, go to Blackboard </a:t>
             </a:r>
           </a:p>
           <a:p>
             <a:pPr lvl="1"/>
             <a:r>
-              <a:rPr lang="en-US" sz="3600" dirty="0"/>
-              <a:t>You received an email with a link</a:t>
-            </a:r>
-          </a:p>
-          <a:p>
-            <a:pPr lvl="2"/>
-            <a:r>
-              <a:rPr lang="en-US" sz="3200" dirty="0"/>
-              <a:t>Sender: </a:t>
-            </a:r>
-            <a:r>
-              <a:rPr lang="en-US" sz="3200" dirty="0" err="1"/>
-              <a:t>c-evals@usc.edu</a:t>
-            </a:r>
-            <a:endParaRPr lang="en-US" sz="3200" dirty="0"/>
-          </a:p>
-          <a:p>
-            <a:pPr lvl="2"/>
-            <a:r>
-              <a:rPr lang="en-US" sz="3200" dirty="0"/>
-              <a:t>Subject: USC Learning Evaluations</a:t>
+              <a:rPr lang="en-US" sz="2800" dirty="0"/>
+              <a:t>Stay on main page (not specific section)</a:t>
             </a:r>
           </a:p>
           <a:p>
             <a:pPr lvl="1"/>
-            <a:r>
-              <a:rPr lang="en-US" sz="3600" dirty="0"/>
-              <a:t>Blackboard (</a:t>
-            </a:r>
-            <a:r>
-              <a:rPr lang="en-US" sz="3600" dirty="0">
-                <a:hlinkClick r:id="rId2"/>
-              </a:rPr>
-              <a:t>https://blackboard.usc.edu</a:t>
-            </a:r>
-            <a:r>
-              <a:rPr lang="en-US" sz="3600" dirty="0"/>
-              <a:t>) </a:t>
-            </a:r>
-          </a:p>
-          <a:p>
-            <a:pPr lvl="2"/>
-            <a:r>
-              <a:rPr lang="en-US" sz="3200" dirty="0"/>
-              <a:t>Stay on main page (not specific section)</a:t>
-            </a:r>
-          </a:p>
-          <a:p>
-            <a:pPr lvl="2"/>
             <a:r>
               <a:rPr lang="en-US" sz="3200" dirty="0"/>
               <a:t>Click on "Course Evaluations" tab in the upper left hand navigation bar</a:t>
@@ -1386,29 +1411,10 @@
           </a:p>
           <a:p>
             <a:pPr lvl="1"/>
-            <a:r>
-              <a:rPr lang="en-US" sz="3600" dirty="0"/>
-              <a:t>If our section gets 50% response rate, I'll add one point to the final project, and two points if over 75%</a:t>
-            </a:r>
-          </a:p>
-          <a:p>
-            <a:pPr lvl="1"/>
-            <a:r>
-              <a:rPr lang="en-US" sz="3600" dirty="0"/>
-              <a:t>Responses are anonymous and I won't see until after grades </a:t>
-            </a:r>
-            <a:r>
-              <a:rPr lang="en-US" sz="3600"/>
-              <a:t>are submitted</a:t>
-            </a:r>
-            <a:endParaRPr lang="en-US" sz="3600" dirty="0"/>
-          </a:p>
-          <a:p>
-            <a:pPr lvl="1"/>
-            <a:endParaRPr lang="en-US" dirty="0"/>
-          </a:p>
-          <a:p>
-            <a:endParaRPr lang="en-US" dirty="0"/>
+            <a:endParaRPr lang="en-US" sz="1800" dirty="0"/>
+          </a:p>
+          <a:p>
+            <a:endParaRPr lang="en-US" sz="2000" dirty="0"/>
           </a:p>
         </p:txBody>
       </p:sp>

</xml_diff>